<commit_message>
Updated the document with Shakil's input for Section 3 and Updated the project description.
</commit_message>
<xml_diff>
--- a/00_Documentation/M03_TeamProject_Haid_UWB-Presentation.pptx
+++ b/00_Documentation/M03_TeamProject_Haid_UWB-Presentation.pptx
@@ -280,7 +280,7 @@
             <a:fld id="{8670A5EB-ECD4-4B29-9C76-251B805226F9}" type="datetimeFigureOut">
               <a:rPr lang="en-US" smtClean="0"/>
               <a:pPr/>
-              <a:t>7/12/2021</a:t>
+              <a:t>7/25/2021</a:t>
             </a:fld>
             <a:endParaRPr lang="en-US"/>
           </a:p>
@@ -447,7 +447,7 @@
             <a:fld id="{E840019B-648C-422C-9A09-38EB6005BFDA}" type="datetimeFigureOut">
               <a:rPr lang="en-US" smtClean="0"/>
               <a:pPr/>
-              <a:t>7/12/2021</a:t>
+              <a:t>7/25/2021</a:t>
             </a:fld>
             <a:endParaRPr lang="en-US"/>
           </a:p>
@@ -1046,7 +1046,7 @@
           <a:p>
             <a:fld id="{019E7938-BCEF-4D8F-8A88-9B0280600C13}" type="datetime4">
               <a:rPr lang="de-DE" smtClean="0"/>
-              <a:t>12. Juli 2021</a:t>
+              <a:t>25. Juli 2021</a:t>
             </a:fld>
             <a:endParaRPr lang="de-DE" dirty="0"/>
           </a:p>
@@ -1320,7 +1320,7 @@
           <a:p>
             <a:fld id="{6D824872-EBAE-46ED-9958-F7BE407DE8D2}" type="datetime4">
               <a:rPr lang="de-DE" smtClean="0"/>
-              <a:t>12. Juli 2021</a:t>
+              <a:t>25. Juli 2021</a:t>
             </a:fld>
             <a:endParaRPr lang="de-DE" dirty="0"/>
           </a:p>
@@ -1530,7 +1530,7 @@
           <a:p>
             <a:fld id="{6D824872-EBAE-46ED-9958-F7BE407DE8D2}" type="datetime4">
               <a:rPr lang="de-DE" smtClean="0"/>
-              <a:t>12. Juli 2021</a:t>
+              <a:t>25. Juli 2021</a:t>
             </a:fld>
             <a:endParaRPr lang="de-DE" dirty="0"/>
           </a:p>
@@ -1867,7 +1867,7 @@
           <a:p>
             <a:fld id="{0AA6A56A-66E0-4B3A-8C58-C43BFA9D9142}" type="datetime4">
               <a:rPr lang="de-DE" smtClean="0"/>
-              <a:t>12. Juli 2021</a:t>
+              <a:t>25. Juli 2021</a:t>
             </a:fld>
             <a:endParaRPr lang="de-DE" dirty="0"/>
           </a:p>
@@ -2104,7 +2104,7 @@
           <a:p>
             <a:fld id="{47682754-E2D0-4B70-82E5-F6F91D694057}" type="datetime4">
               <a:rPr lang="de-DE" smtClean="0"/>
-              <a:t>12. Juli 2021</a:t>
+              <a:t>25. Juli 2021</a:t>
             </a:fld>
             <a:endParaRPr lang="de-DE" dirty="0"/>
           </a:p>
@@ -2179,7 +2179,7 @@
           <a:p>
             <a:fld id="{019E7938-BCEF-4D8F-8A88-9B0280600C13}" type="datetime4">
               <a:rPr lang="de-DE" smtClean="0"/>
-              <a:t>12. Juli 2021</a:t>
+              <a:t>25. Juli 2021</a:t>
             </a:fld>
             <a:endParaRPr lang="de-DE" dirty="0"/>
           </a:p>
@@ -2519,7 +2519,7 @@
           <a:p>
             <a:fld id="{4CFC5109-B8D2-416A-AEC5-15F86CE44A5A}" type="datetime4">
               <a:rPr lang="de-DE" smtClean="0"/>
-              <a:t>12. Juli 2021</a:t>
+              <a:t>25. Juli 2021</a:t>
             </a:fld>
             <a:endParaRPr lang="de-DE"/>
           </a:p>
@@ -2615,7 +2615,7 @@
           <a:p>
             <a:fld id="{4DB03519-3429-4C41-999A-042689903FB9}" type="datetime4">
               <a:rPr lang="de-DE" smtClean="0"/>
-              <a:t>12. Juli 2021</a:t>
+              <a:t>25. Juli 2021</a:t>
             </a:fld>
             <a:endParaRPr lang="de-DE"/>
           </a:p>
@@ -2796,7 +2796,7 @@
           <a:p>
             <a:fld id="{363D00BD-08FB-4CA0-BE5D-EE8CEE326305}" type="datetime4">
               <a:rPr lang="de-DE" smtClean="0"/>
-              <a:t>12. Juli 2021</a:t>
+              <a:t>25. Juli 2021</a:t>
             </a:fld>
             <a:endParaRPr lang="de-DE"/>
           </a:p>
@@ -2977,7 +2977,7 @@
           <a:p>
             <a:fld id="{1927CAE6-F30A-4665-ABC0-1E520C70DB77}" type="datetime4">
               <a:rPr lang="de-DE" smtClean="0"/>
-              <a:t>12. Juli 2021</a:t>
+              <a:t>25. Juli 2021</a:t>
             </a:fld>
             <a:endParaRPr lang="de-DE"/>
           </a:p>
@@ -3243,7 +3243,7 @@
           <a:p>
             <a:fld id="{701F833E-974C-48EF-8F56-C11F8FACFD03}" type="datetime4">
               <a:rPr lang="de-DE" smtClean="0"/>
-              <a:t>12. Juli 2021</a:t>
+              <a:t>25. Juli 2021</a:t>
             </a:fld>
             <a:endParaRPr lang="de-DE"/>
           </a:p>
@@ -3424,7 +3424,7 @@
           <a:p>
             <a:fld id="{6D824872-EBAE-46ED-9958-F7BE407DE8D2}" type="datetime4">
               <a:rPr lang="de-DE" smtClean="0"/>
-              <a:t>12. Juli 2021</a:t>
+              <a:t>25. Juli 2021</a:t>
             </a:fld>
             <a:endParaRPr lang="de-DE" dirty="0"/>
           </a:p>
@@ -3709,7 +3709,7 @@
           <a:p>
             <a:fld id="{5058B3C0-0291-4718-9782-92D19770687F}" type="datetime4">
               <a:rPr lang="de-DE" smtClean="0"/>
-              <a:t>12. Juli 2021</a:t>
+              <a:t>25. Juli 2021</a:t>
             </a:fld>
             <a:endParaRPr lang="de-DE"/>
           </a:p>
@@ -4004,7 +4004,7 @@
           <a:p>
             <a:fld id="{B9BAE3A7-EB67-4715-BBE4-595CC3A07BF1}" type="datetime4">
               <a:rPr lang="de-DE" smtClean="0"/>
-              <a:t>12. Juli 2021</a:t>
+              <a:t>25. Juli 2021</a:t>
             </a:fld>
             <a:endParaRPr lang="de-DE"/>
           </a:p>
@@ -4504,7 +4504,7 @@
           <a:p>
             <a:fld id="{7CDA6789-66FE-42BB-B23B-F2001F64DD54}" type="datetime4">
               <a:rPr lang="de-DE" smtClean="0"/>
-              <a:t>12. Juli 2021</a:t>
+              <a:t>25. Juli 2021</a:t>
             </a:fld>
             <a:endParaRPr lang="de-DE"/>
           </a:p>
@@ -4940,7 +4940,7 @@
           <a:p>
             <a:fld id="{251E5DB6-993B-40F3-9C25-44982B1CF812}" type="datetime4">
               <a:rPr lang="de-DE" smtClean="0"/>
-              <a:t>12. Juli 2021</a:t>
+              <a:t>25. Juli 2021</a:t>
             </a:fld>
             <a:endParaRPr lang="de-DE"/>
           </a:p>
@@ -5121,7 +5121,7 @@
           <a:p>
             <a:fld id="{1D3C2988-747C-4A21-8A7B-722DA28EC8DD}" type="datetime4">
               <a:rPr lang="de-DE" smtClean="0"/>
-              <a:t>12. Juli 2021</a:t>
+              <a:t>25. Juli 2021</a:t>
             </a:fld>
             <a:endParaRPr lang="de-DE"/>
           </a:p>
@@ -5856,7 +5856,7 @@
           <a:p>
             <a:fld id="{28B28DD0-C31C-4665-8217-D8684365DAE6}" type="datetime4">
               <a:rPr lang="de-DE" smtClean="0"/>
-              <a:t>12. Juli 2021</a:t>
+              <a:t>25. Juli 2021</a:t>
             </a:fld>
             <a:endParaRPr lang="de-DE"/>
           </a:p>
@@ -6255,7 +6255,7 @@
           <a:p>
             <a:fld id="{C9EAF196-E69A-4C8D-8DA1-C9680C5895D1}" type="datetime4">
               <a:rPr lang="de-DE" smtClean="0"/>
-              <a:t>12. Juli 2021</a:t>
+              <a:t>25. Juli 2021</a:t>
             </a:fld>
             <a:endParaRPr lang="de-DE"/>
           </a:p>
@@ -6776,7 +6776,7 @@
           <a:p>
             <a:fld id="{68A34680-42ED-45FA-96EF-B22FC8F95CA6}" type="datetime4">
               <a:rPr lang="de-DE" smtClean="0"/>
-              <a:t>12. Juli 2021</a:t>
+              <a:t>25. Juli 2021</a:t>
             </a:fld>
             <a:endParaRPr lang="de-DE"/>
           </a:p>
@@ -7382,7 +7382,7 @@
           <a:p>
             <a:fld id="{E8A4740C-6A0C-496C-97D9-3F6AEA918594}" type="datetime4">
               <a:rPr lang="de-DE" smtClean="0"/>
-              <a:t>12. Juli 2021</a:t>
+              <a:t>25. Juli 2021</a:t>
             </a:fld>
             <a:endParaRPr lang="de-DE"/>
           </a:p>
@@ -7640,7 +7640,7 @@
           <a:p>
             <a:fld id="{6D824872-EBAE-46ED-9958-F7BE407DE8D2}" type="datetime4">
               <a:rPr lang="de-DE" smtClean="0"/>
-              <a:t>12. Juli 2021</a:t>
+              <a:t>25. Juli 2021</a:t>
             </a:fld>
             <a:endParaRPr lang="de-DE" dirty="0"/>
           </a:p>
@@ -8180,7 +8180,7 @@
           <a:p>
             <a:fld id="{7F0EAEE2-B697-4996-9AB6-B2AC608AD820}" type="datetime4">
               <a:rPr lang="de-DE" smtClean="0"/>
-              <a:t>12. Juli 2021</a:t>
+              <a:t>25. Juli 2021</a:t>
             </a:fld>
             <a:endParaRPr lang="de-DE"/>
           </a:p>
@@ -8361,7 +8361,7 @@
           <a:p>
             <a:fld id="{62546B1B-AA55-4C9B-887A-18EFA05E72DC}" type="datetime4">
               <a:rPr lang="de-DE" smtClean="0"/>
-              <a:t>12. Juli 2021</a:t>
+              <a:t>25. Juli 2021</a:t>
             </a:fld>
             <a:endParaRPr lang="de-DE"/>
           </a:p>
@@ -8542,7 +8542,7 @@
           <a:p>
             <a:fld id="{8059DF19-E6CD-413D-B802-0D01F0F2F9A6}" type="datetime4">
               <a:rPr lang="de-DE" smtClean="0"/>
-              <a:t>12. Juli 2021</a:t>
+              <a:t>25. Juli 2021</a:t>
             </a:fld>
             <a:endParaRPr lang="de-DE"/>
           </a:p>
@@ -8723,7 +8723,7 @@
           <a:p>
             <a:fld id="{FD6C0267-61AC-4BEC-B42A-4CAC221261AF}" type="datetime4">
               <a:rPr lang="de-DE" smtClean="0"/>
-              <a:t>12. Juli 2021</a:t>
+              <a:t>25. Juli 2021</a:t>
             </a:fld>
             <a:endParaRPr lang="de-DE"/>
           </a:p>
@@ -9188,7 +9188,7 @@
           <a:p>
             <a:fld id="{1241F50D-4C6C-4E63-98EB-C643F32A4A25}" type="datetime4">
               <a:rPr lang="de-DE" smtClean="0"/>
-              <a:t>12. Juli 2021</a:t>
+              <a:t>25. Juli 2021</a:t>
             </a:fld>
             <a:endParaRPr lang="de-DE"/>
           </a:p>
@@ -9369,7 +9369,7 @@
           <a:p>
             <a:fld id="{154261B4-AEF4-4C62-8486-1FEBF23F640F}" type="datetime4">
               <a:rPr lang="de-DE" smtClean="0"/>
-              <a:t>12. Juli 2021</a:t>
+              <a:t>25. Juli 2021</a:t>
             </a:fld>
             <a:endParaRPr lang="de-DE"/>
           </a:p>
@@ -9566,7 +9566,7 @@
           <a:p>
             <a:fld id="{CC32C888-7D1E-40D8-85A4-DA3B4FF3C9FF}" type="datetime4">
               <a:rPr lang="de-DE" smtClean="0"/>
-              <a:t>12. Juli 2021</a:t>
+              <a:t>25. Juli 2021</a:t>
             </a:fld>
             <a:endParaRPr lang="de-DE"/>
           </a:p>
@@ -9832,7 +9832,7 @@
           <a:p>
             <a:fld id="{92927DB4-5A2C-4CE1-814E-E3C24F3E3DAA}" type="datetime4">
               <a:rPr lang="de-DE" smtClean="0"/>
-              <a:t>12. Juli 2021</a:t>
+              <a:t>25. Juli 2021</a:t>
             </a:fld>
             <a:endParaRPr lang="de-DE"/>
           </a:p>
@@ -10098,7 +10098,7 @@
           <a:p>
             <a:fld id="{E218E598-D131-4213-A78C-E2029E299CB0}" type="datetime4">
               <a:rPr lang="de-DE" smtClean="0"/>
-              <a:t>12. Juli 2021</a:t>
+              <a:t>25. Juli 2021</a:t>
             </a:fld>
             <a:endParaRPr lang="de-DE"/>
           </a:p>
@@ -10279,7 +10279,7 @@
           <a:p>
             <a:fld id="{E1149281-CE5D-40E2-B6CE-94AD3EE6899B}" type="datetime4">
               <a:rPr lang="de-DE" smtClean="0"/>
-              <a:t>12. Juli 2021</a:t>
+              <a:t>25. Juli 2021</a:t>
             </a:fld>
             <a:endParaRPr lang="de-DE"/>
           </a:p>
@@ -10527,7 +10527,7 @@
           <a:p>
             <a:fld id="{6D824872-EBAE-46ED-9958-F7BE407DE8D2}" type="datetime4">
               <a:rPr lang="de-DE" smtClean="0"/>
-              <a:t>12. Juli 2021</a:t>
+              <a:t>25. Juli 2021</a:t>
             </a:fld>
             <a:endParaRPr lang="de-DE" dirty="0"/>
           </a:p>
@@ -10941,7 +10941,7 @@
           <a:p>
             <a:fld id="{6D824872-EBAE-46ED-9958-F7BE407DE8D2}" type="datetime4">
               <a:rPr lang="de-DE" smtClean="0"/>
-              <a:t>12. Juli 2021</a:t>
+              <a:t>25. Juli 2021</a:t>
             </a:fld>
             <a:endParaRPr lang="de-DE" dirty="0"/>
           </a:p>
@@ -11084,7 +11084,7 @@
           <a:p>
             <a:fld id="{6D824872-EBAE-46ED-9958-F7BE407DE8D2}" type="datetime4">
               <a:rPr lang="de-DE" smtClean="0"/>
-              <a:t>12. Juli 2021</a:t>
+              <a:t>25. Juli 2021</a:t>
             </a:fld>
             <a:endParaRPr lang="de-DE" dirty="0"/>
           </a:p>
@@ -11199,7 +11199,7 @@
           <a:p>
             <a:fld id="{6D824872-EBAE-46ED-9958-F7BE407DE8D2}" type="datetime4">
               <a:rPr lang="de-DE" smtClean="0"/>
-              <a:t>12. Juli 2021</a:t>
+              <a:t>25. Juli 2021</a:t>
             </a:fld>
             <a:endParaRPr lang="de-DE" dirty="0"/>
           </a:p>
@@ -11512,7 +11512,7 @@
           <a:p>
             <a:fld id="{6D824872-EBAE-46ED-9958-F7BE407DE8D2}" type="datetime4">
               <a:rPr lang="de-DE" smtClean="0"/>
-              <a:t>12. Juli 2021</a:t>
+              <a:t>25. Juli 2021</a:t>
             </a:fld>
             <a:endParaRPr lang="de-DE" dirty="0"/>
           </a:p>
@@ -11802,7 +11802,7 @@
           <a:p>
             <a:fld id="{6D824872-EBAE-46ED-9958-F7BE407DE8D2}" type="datetime4">
               <a:rPr lang="de-DE" smtClean="0"/>
-              <a:t>12. Juli 2021</a:t>
+              <a:t>25. Juli 2021</a:t>
             </a:fld>
             <a:endParaRPr lang="de-DE" dirty="0"/>
           </a:p>
@@ -12045,7 +12045,7 @@
           <a:p>
             <a:fld id="{6D824872-EBAE-46ED-9958-F7BE407DE8D2}" type="datetime4">
               <a:rPr lang="de-DE" smtClean="0"/>
-              <a:t>12. Juli 2021</a:t>
+              <a:t>25. Juli 2021</a:t>
             </a:fld>
             <a:endParaRPr lang="de-DE" dirty="0"/>
           </a:p>

</xml_diff>